<commit_message>
Add link to download zip
</commit_message>
<xml_diff>
--- a/slides/cwl_workshop.pptx
+++ b/slides/cwl_workshop.pptx
@@ -5119,11 +5119,6 @@
               </a:rPr>
               <a:t>/2OVcyeg</a:t>
             </a:r>
-            <a:endParaRPr lang="en-US" sz="1400" dirty="0">
-              <a:latin typeface="Menlo" charset="0"/>
-              <a:ea typeface="Menlo" charset="0"/>
-              <a:cs typeface="Menlo" charset="0"/>
-            </a:endParaRPr>
           </a:p>
         </p:txBody>
       </p:sp>
@@ -5409,7 +5404,7 @@
                 <a:cs typeface="Menlo" charset="0"/>
                 <a:hlinkClick r:id="rId6"/>
               </a:rPr>
-              <a:t>download.oracle.com/otn-pub/java/jdk/8u191-b12/2787e4a523244c269598db4e85c51e0c/jdk-8u191-windows-x64.exe</a:t>
+              <a:t>www.oracle.com/technetwork/java/javase/downloads/jdk8-downloads-2133151.html</a:t>
             </a:r>
             <a:endParaRPr lang="en-US" sz="1200" dirty="0">
               <a:latin typeface="Menlo" charset="0"/>
@@ -5427,31 +5422,22 @@
               <a:t>MacOS         </a:t>
             </a:r>
             <a:r>
+              <a:rPr lang="en-US" sz="1200" dirty="0">
+                <a:latin typeface="Menlo" charset="0"/>
+                <a:ea typeface="Menlo" charset="0"/>
+                <a:cs typeface="Menlo" charset="0"/>
+                <a:hlinkClick r:id="rId6"/>
+              </a:rPr>
+              <a:t>http://</a:t>
+            </a:r>
+            <a:r>
               <a:rPr lang="en-US" sz="1200" dirty="0" smtClean="0">
                 <a:latin typeface="Menlo" charset="0"/>
                 <a:ea typeface="Menlo" charset="0"/>
                 <a:cs typeface="Menlo" charset="0"/>
-                <a:hlinkClick r:id="rId7"/>
-              </a:rPr>
-              <a:t>http</a:t>
-            </a:r>
-            <a:r>
-              <a:rPr lang="en-US" sz="1200" dirty="0">
-                <a:latin typeface="Menlo" charset="0"/>
-                <a:ea typeface="Menlo" charset="0"/>
-                <a:cs typeface="Menlo" charset="0"/>
-                <a:hlinkClick r:id="rId7"/>
-              </a:rPr>
-              <a:t>://</a:t>
-            </a:r>
-            <a:r>
-              <a:rPr lang="en-US" sz="1200" dirty="0" smtClean="0">
-                <a:latin typeface="Menlo" charset="0"/>
-                <a:ea typeface="Menlo" charset="0"/>
-                <a:cs typeface="Menlo" charset="0"/>
-                <a:hlinkClick r:id="rId7"/>
-              </a:rPr>
-              <a:t>download.oracle.com/otn-pub/java/jdk/8u191-b12/2787e4a523244c269598db4e85c51e0c/jdk-8u191-macosx-x64.dmg</a:t>
+                <a:hlinkClick r:id="rId6"/>
+              </a:rPr>
+              <a:t>www.oracle.com/technetwork/java/javase/downloads/jdk8-downloads-2133151.html</a:t>
             </a:r>
             <a:endParaRPr lang="en-US" sz="1200" dirty="0" smtClean="0">
               <a:latin typeface="Menlo" charset="0"/>
@@ -5469,20 +5455,91 @@
               <a:t>Ubuntu        </a:t>
             </a:r>
             <a:r>
+              <a:rPr lang="en-US" sz="1200" dirty="0">
+                <a:latin typeface="Menlo" charset="0"/>
+                <a:ea typeface="Menlo" charset="0"/>
+                <a:cs typeface="Menlo" charset="0"/>
+                <a:hlinkClick r:id="rId6"/>
+              </a:rPr>
+              <a:t>http://</a:t>
+            </a:r>
+            <a:r>
               <a:rPr lang="en-US" sz="1200" dirty="0" smtClean="0">
                 <a:latin typeface="Menlo" charset="0"/>
                 <a:ea typeface="Menlo" charset="0"/>
                 <a:cs typeface="Menlo" charset="0"/>
-                <a:hlinkClick r:id="rId8"/>
-              </a:rPr>
-              <a:t>http</a:t>
+                <a:hlinkClick r:id="rId6"/>
+              </a:rPr>
+              <a:t>www.oracle.com/technetwork/java/javase/downloads/jdk8-downloads-2133151.html</a:t>
+            </a:r>
+            <a:endParaRPr lang="en-US" sz="1200" dirty="0">
+              <a:latin typeface="Menlo" charset="0"/>
+              <a:ea typeface="Menlo" charset="0"/>
+              <a:cs typeface="Menlo" charset="0"/>
+            </a:endParaRPr>
+          </a:p>
+        </p:txBody>
+      </p:sp>
+      <p:sp>
+        <p:nvSpPr>
+          <p:cNvPr id="5" name="TextBox 4"/>
+          <p:cNvSpPr txBox="1"/>
+          <p:nvPr/>
+        </p:nvSpPr>
+        <p:spPr>
+          <a:xfrm>
+            <a:off x="1" y="4122858"/>
+            <a:ext cx="12191999" cy="1169551"/>
+          </a:xfrm>
+          <a:prstGeom prst="rect">
+            <a:avLst/>
+          </a:prstGeom>
+          <a:noFill/>
+        </p:spPr>
+        <p:txBody>
+          <a:bodyPr wrap="square" rtlCol="0">
+            <a:spAutoFit/>
+          </a:bodyPr>
+          <a:lstStyle/>
+          <a:p>
+            <a:r>
+              <a:rPr lang="en-US" sz="1400" b="1" dirty="0" smtClean="0">
+                <a:latin typeface="Menlo" charset="0"/>
+                <a:ea typeface="Menlo" charset="0"/>
+                <a:cs typeface="Menlo" charset="0"/>
+              </a:rPr>
+              <a:t>Docker </a:t>
+            </a:r>
+            <a:endParaRPr lang="en-US" sz="1400" b="1" dirty="0">
+              <a:latin typeface="Menlo" charset="0"/>
+              <a:ea typeface="Menlo" charset="0"/>
+              <a:cs typeface="Menlo" charset="0"/>
+            </a:endParaRPr>
+          </a:p>
+          <a:p>
+            <a:r>
+              <a:rPr lang="en-US" sz="1400" dirty="0" smtClean="0">
+                <a:latin typeface="Menlo" charset="0"/>
+                <a:ea typeface="Menlo" charset="0"/>
+                <a:cs typeface="Menlo" charset="0"/>
+              </a:rPr>
+              <a:t>Windows 10    </a:t>
+            </a:r>
+            <a:r>
+              <a:rPr lang="en-US" sz="1200" dirty="0" smtClean="0">
+                <a:latin typeface="Menlo" charset="0"/>
+                <a:ea typeface="Menlo" charset="0"/>
+                <a:cs typeface="Menlo" charset="0"/>
+                <a:hlinkClick r:id="rId7" invalidUrl="https://download.docker.com/win/stable/Docker for Windows Installer.exe"/>
+              </a:rPr>
+              <a:t>https</a:t>
             </a:r>
             <a:r>
               <a:rPr lang="en-US" sz="1200" dirty="0">
                 <a:latin typeface="Menlo" charset="0"/>
                 <a:ea typeface="Menlo" charset="0"/>
                 <a:cs typeface="Menlo" charset="0"/>
-                <a:hlinkClick r:id="rId8"/>
+                <a:hlinkClick r:id="rId8" invalidUrl="https://download.docker.com/win/stable/Docker for Windows Installer.exe"/>
               </a:rPr>
               <a:t>://</a:t>
             </a:r>
@@ -5491,9 +5548,9 @@
                 <a:latin typeface="Menlo" charset="0"/>
                 <a:ea typeface="Menlo" charset="0"/>
                 <a:cs typeface="Menlo" charset="0"/>
-                <a:hlinkClick r:id="rId8"/>
-              </a:rPr>
-              <a:t>download.oracle.com/otn-pub/java/jdk/8u191-b12/2787e4a523244c269598db4e85c51e0c/jdk-8u191-linux-x64.rpm</a:t>
+                <a:hlinkClick r:id="rId9" invalidUrl="https://download.docker.com/win/stable/Docker for Windows Installer.exe"/>
+              </a:rPr>
+              <a:t>download.docker.com/win/stable/Docker%20for%20Windows%20Installer.exe</a:t>
             </a:r>
             <a:endParaRPr lang="en-US" sz="1200" dirty="0" smtClean="0">
               <a:latin typeface="Menlo" charset="0"/>
@@ -5501,44 +5558,6 @@
               <a:cs typeface="Menlo" charset="0"/>
             </a:endParaRPr>
           </a:p>
-        </p:txBody>
-      </p:sp>
-      <p:sp>
-        <p:nvSpPr>
-          <p:cNvPr id="5" name="TextBox 4"/>
-          <p:cNvSpPr txBox="1"/>
-          <p:nvPr/>
-        </p:nvSpPr>
-        <p:spPr>
-          <a:xfrm>
-            <a:off x="1" y="4122858"/>
-            <a:ext cx="12191999" cy="1169551"/>
-          </a:xfrm>
-          <a:prstGeom prst="rect">
-            <a:avLst/>
-          </a:prstGeom>
-          <a:noFill/>
-        </p:spPr>
-        <p:txBody>
-          <a:bodyPr wrap="square" rtlCol="0">
-            <a:spAutoFit/>
-          </a:bodyPr>
-          <a:lstStyle/>
-          <a:p>
-            <a:r>
-              <a:rPr lang="en-US" sz="1400" b="1" dirty="0" smtClean="0">
-                <a:latin typeface="Menlo" charset="0"/>
-                <a:ea typeface="Menlo" charset="0"/>
-                <a:cs typeface="Menlo" charset="0"/>
-              </a:rPr>
-              <a:t>Docker </a:t>
-            </a:r>
-            <a:endParaRPr lang="en-US" sz="1400" b="1" dirty="0">
-              <a:latin typeface="Menlo" charset="0"/>
-              <a:ea typeface="Menlo" charset="0"/>
-              <a:cs typeface="Menlo" charset="0"/>
-            </a:endParaRPr>
-          </a:p>
           <a:p>
             <a:r>
               <a:rPr lang="en-US" sz="1400" dirty="0" smtClean="0">
@@ -5546,14 +5565,14 @@
                 <a:ea typeface="Menlo" charset="0"/>
                 <a:cs typeface="Menlo" charset="0"/>
               </a:rPr>
-              <a:t>Windows 10    </a:t>
+              <a:t>Windows &lt; 10  </a:t>
             </a:r>
             <a:r>
               <a:rPr lang="en-US" sz="1200" dirty="0" smtClean="0">
                 <a:latin typeface="Menlo" charset="0"/>
                 <a:ea typeface="Menlo" charset="0"/>
                 <a:cs typeface="Menlo" charset="0"/>
-                <a:hlinkClick r:id="rId9" invalidUrl="https://download.docker.com/win/stable/Docker for Windows Installer.exe"/>
+                <a:hlinkClick r:id="rId10"/>
               </a:rPr>
               <a:t>https</a:t>
             </a:r>
@@ -5562,7 +5581,7 @@
                 <a:latin typeface="Menlo" charset="0"/>
                 <a:ea typeface="Menlo" charset="0"/>
                 <a:cs typeface="Menlo" charset="0"/>
-                <a:hlinkClick r:id="rId10" invalidUrl="https://download.docker.com/win/stable/Docker for Windows Installer.exe"/>
+                <a:hlinkClick r:id="rId10"/>
               </a:rPr>
               <a:t>://</a:t>
             </a:r>
@@ -5571,9 +5590,9 @@
                 <a:latin typeface="Menlo" charset="0"/>
                 <a:ea typeface="Menlo" charset="0"/>
                 <a:cs typeface="Menlo" charset="0"/>
-                <a:hlinkClick r:id="rId11" invalidUrl="https://download.docker.com/win/stable/Docker for Windows Installer.exe"/>
-              </a:rPr>
-              <a:t>download.docker.com/win/stable/Docker%20for%20Windows%20Installer.exe</a:t>
+                <a:hlinkClick r:id="rId10"/>
+              </a:rPr>
+              <a:t>download.docker.com/win/stable/DockerToolbox.exe</a:t>
             </a:r>
             <a:endParaRPr lang="en-US" sz="1200" dirty="0" smtClean="0">
               <a:latin typeface="Menlo" charset="0"/>
@@ -5588,14 +5607,14 @@
                 <a:ea typeface="Menlo" charset="0"/>
                 <a:cs typeface="Menlo" charset="0"/>
               </a:rPr>
-              <a:t>Windows &lt; 10  </a:t>
+              <a:t>MacOS         </a:t>
             </a:r>
             <a:r>
               <a:rPr lang="en-US" sz="1200" dirty="0" smtClean="0">
                 <a:latin typeface="Menlo" charset="0"/>
                 <a:ea typeface="Menlo" charset="0"/>
                 <a:cs typeface="Menlo" charset="0"/>
-                <a:hlinkClick r:id="rId12"/>
+                <a:hlinkClick r:id="rId11"/>
               </a:rPr>
               <a:t>https</a:t>
             </a:r>
@@ -5604,7 +5623,7 @@
                 <a:latin typeface="Menlo" charset="0"/>
                 <a:ea typeface="Menlo" charset="0"/>
                 <a:cs typeface="Menlo" charset="0"/>
-                <a:hlinkClick r:id="rId12"/>
+                <a:hlinkClick r:id="rId11"/>
               </a:rPr>
               <a:t>://</a:t>
             </a:r>
@@ -5613,9 +5632,9 @@
                 <a:latin typeface="Menlo" charset="0"/>
                 <a:ea typeface="Menlo" charset="0"/>
                 <a:cs typeface="Menlo" charset="0"/>
-                <a:hlinkClick r:id="rId12"/>
-              </a:rPr>
-              <a:t>download.docker.com/win/stable/DockerToolbox.exe</a:t>
+                <a:hlinkClick r:id="rId11"/>
+              </a:rPr>
+              <a:t>download.docker.com/mac/stable/Docker.dmg</a:t>
             </a:r>
             <a:endParaRPr lang="en-US" sz="1200" dirty="0" smtClean="0">
               <a:latin typeface="Menlo" charset="0"/>
@@ -5630,14 +5649,14 @@
                 <a:ea typeface="Menlo" charset="0"/>
                 <a:cs typeface="Menlo" charset="0"/>
               </a:rPr>
-              <a:t>MacOS         </a:t>
+              <a:t>Ubuntu        </a:t>
             </a:r>
             <a:r>
               <a:rPr lang="en-US" sz="1200" dirty="0" smtClean="0">
                 <a:latin typeface="Menlo" charset="0"/>
                 <a:ea typeface="Menlo" charset="0"/>
                 <a:cs typeface="Menlo" charset="0"/>
-                <a:hlinkClick r:id="rId13"/>
+                <a:hlinkClick r:id="rId12"/>
               </a:rPr>
               <a:t>https</a:t>
             </a:r>
@@ -5646,58 +5665,16 @@
                 <a:latin typeface="Menlo" charset="0"/>
                 <a:ea typeface="Menlo" charset="0"/>
                 <a:cs typeface="Menlo" charset="0"/>
-                <a:hlinkClick r:id="rId13"/>
-              </a:rPr>
-              <a:t>://</a:t>
+                <a:hlinkClick r:id="rId12"/>
+              </a:rPr>
+              <a:t>://docs.docker.com/install/linux/docker-ce/ubuntu</a:t>
             </a:r>
             <a:r>
               <a:rPr lang="en-US" sz="1200" dirty="0" smtClean="0">
                 <a:latin typeface="Menlo" charset="0"/>
                 <a:ea typeface="Menlo" charset="0"/>
                 <a:cs typeface="Menlo" charset="0"/>
-                <a:hlinkClick r:id="rId13"/>
-              </a:rPr>
-              <a:t>download.docker.com/mac/stable/Docker.dmg</a:t>
-            </a:r>
-            <a:endParaRPr lang="en-US" sz="1200" dirty="0" smtClean="0">
-              <a:latin typeface="Menlo" charset="0"/>
-              <a:ea typeface="Menlo" charset="0"/>
-              <a:cs typeface="Menlo" charset="0"/>
-            </a:endParaRPr>
-          </a:p>
-          <a:p>
-            <a:r>
-              <a:rPr lang="en-US" sz="1400" dirty="0" smtClean="0">
-                <a:latin typeface="Menlo" charset="0"/>
-                <a:ea typeface="Menlo" charset="0"/>
-                <a:cs typeface="Menlo" charset="0"/>
-              </a:rPr>
-              <a:t>Ubuntu        </a:t>
-            </a:r>
-            <a:r>
-              <a:rPr lang="en-US" sz="1200" dirty="0" smtClean="0">
-                <a:latin typeface="Menlo" charset="0"/>
-                <a:ea typeface="Menlo" charset="0"/>
-                <a:cs typeface="Menlo" charset="0"/>
-                <a:hlinkClick r:id="rId14"/>
-              </a:rPr>
-              <a:t>https</a:t>
-            </a:r>
-            <a:r>
-              <a:rPr lang="en-US" sz="1200" dirty="0">
-                <a:latin typeface="Menlo" charset="0"/>
-                <a:ea typeface="Menlo" charset="0"/>
-                <a:cs typeface="Menlo" charset="0"/>
-                <a:hlinkClick r:id="rId14"/>
-              </a:rPr>
-              <a:t>://docs.docker.com/install/linux/docker-ce/ubuntu</a:t>
-            </a:r>
-            <a:r>
-              <a:rPr lang="en-US" sz="1200" dirty="0" smtClean="0">
-                <a:latin typeface="Menlo" charset="0"/>
-                <a:ea typeface="Menlo" charset="0"/>
-                <a:cs typeface="Menlo" charset="0"/>
-                <a:hlinkClick r:id="rId14"/>
+                <a:hlinkClick r:id="rId12"/>
               </a:rPr>
               <a:t>/</a:t>
             </a:r>
@@ -6203,11 +6180,6 @@
               </a:rPr>
               <a:t>/2OVcyeg</a:t>
             </a:r>
-            <a:endParaRPr lang="en-US" sz="1400" dirty="0">
-              <a:latin typeface="Menlo" charset="0"/>
-              <a:ea typeface="Menlo" charset="0"/>
-              <a:cs typeface="Menlo" charset="0"/>
-            </a:endParaRPr>
           </a:p>
         </p:txBody>
       </p:sp>
@@ -8047,11 +8019,6 @@
               </a:rPr>
               <a:t>/2OVcyeg</a:t>
             </a:r>
-            <a:endParaRPr lang="en-US" sz="1400" dirty="0">
-              <a:latin typeface="Menlo" charset="0"/>
-              <a:ea typeface="Menlo" charset="0"/>
-              <a:cs typeface="Menlo" charset="0"/>
-            </a:endParaRPr>
           </a:p>
         </p:txBody>
       </p:sp>
@@ -12491,11 +12458,6 @@
               </a:rPr>
               <a:t>/2OVcyeg</a:t>
             </a:r>
-            <a:endParaRPr lang="en-US" sz="1400" dirty="0">
-              <a:latin typeface="Menlo" charset="0"/>
-              <a:ea typeface="Menlo" charset="0"/>
-              <a:cs typeface="Menlo" charset="0"/>
-            </a:endParaRPr>
           </a:p>
         </p:txBody>
       </p:sp>
@@ -14913,11 +14875,6 @@
               </a:rPr>
               <a:t>/2OVcyeg</a:t>
             </a:r>
-            <a:endParaRPr lang="en-US" sz="1400" dirty="0">
-              <a:latin typeface="Menlo" charset="0"/>
-              <a:ea typeface="Menlo" charset="0"/>
-              <a:cs typeface="Menlo" charset="0"/>
-            </a:endParaRPr>
           </a:p>
         </p:txBody>
       </p:sp>
@@ -16121,11 +16078,6 @@
               </a:rPr>
               <a:t>/2OVcyeg</a:t>
             </a:r>
-            <a:endParaRPr lang="en-US" sz="1400" dirty="0">
-              <a:latin typeface="Menlo" charset="0"/>
-              <a:ea typeface="Menlo" charset="0"/>
-              <a:cs typeface="Menlo" charset="0"/>
-            </a:endParaRPr>
           </a:p>
         </p:txBody>
       </p:sp>
@@ -16659,11 +16611,6 @@
               </a:rPr>
               <a:t>/2OVcyeg</a:t>
             </a:r>
-            <a:endParaRPr lang="en-US" sz="1400" dirty="0">
-              <a:latin typeface="Menlo" charset="0"/>
-              <a:ea typeface="Menlo" charset="0"/>
-              <a:cs typeface="Menlo" charset="0"/>
-            </a:endParaRPr>
           </a:p>
         </p:txBody>
       </p:sp>
@@ -17684,11 +17631,6 @@
               </a:rPr>
               <a:t>/2OVcyeg</a:t>
             </a:r>
-            <a:endParaRPr lang="en-US" sz="1400" dirty="0">
-              <a:latin typeface="Menlo" charset="0"/>
-              <a:ea typeface="Menlo" charset="0"/>
-              <a:cs typeface="Menlo" charset="0"/>
-            </a:endParaRPr>
           </a:p>
         </p:txBody>
       </p:sp>
@@ -19813,11 +19755,6 @@
               </a:rPr>
               <a:t>/2OVcyeg</a:t>
             </a:r>
-            <a:endParaRPr lang="en-US" sz="1400" dirty="0">
-              <a:latin typeface="Menlo" charset="0"/>
-              <a:ea typeface="Menlo" charset="0"/>
-              <a:cs typeface="Menlo" charset="0"/>
-            </a:endParaRPr>
           </a:p>
         </p:txBody>
       </p:sp>

</xml_diff>

<commit_message>
Fix bug in echo tool
Update slides
</commit_message>
<xml_diff>
--- a/slides/cwl_workshop.pptx
+++ b/slides/cwl_workshop.pptx
@@ -6333,8 +6333,8 @@
         </p:nvSpPr>
         <p:spPr>
           <a:xfrm>
-            <a:off x="8080955" y="2021817"/>
-            <a:ext cx="3657600" cy="3416320"/>
+            <a:off x="8080955" y="1807500"/>
+            <a:ext cx="3657600" cy="3970318"/>
           </a:xfrm>
           <a:prstGeom prst="rect">
             <a:avLst/>
@@ -6637,15 +6637,82 @@
               <a:t>    type: </a:t>
             </a:r>
             <a:r>
-              <a:rPr lang="en-US" dirty="0" err="1" smtClean="0">
-                <a:solidFill>
-                  <a:schemeClr val="tx1"/>
-                </a:solidFill>
-                <a:latin typeface="Menlo" charset="0"/>
-                <a:ea typeface="Menlo" charset="0"/>
-                <a:cs typeface="Menlo" charset="0"/>
-              </a:rPr>
-              <a:t>stdout</a:t>
+              <a:rPr lang="en-US" dirty="0" smtClean="0">
+                <a:solidFill>
+                  <a:schemeClr val="tx1"/>
+                </a:solidFill>
+                <a:latin typeface="Menlo" charset="0"/>
+                <a:ea typeface="Menlo" charset="0"/>
+                <a:cs typeface="Menlo" charset="0"/>
+              </a:rPr>
+              <a:t>File</a:t>
+            </a:r>
+          </a:p>
+          <a:p>
+            <a:r>
+              <a:rPr lang="en-US" dirty="0" smtClean="0">
+                <a:solidFill>
+                  <a:schemeClr val="tx1"/>
+                </a:solidFill>
+                <a:latin typeface="Menlo" charset="0"/>
+                <a:ea typeface="Menlo" charset="0"/>
+                <a:cs typeface="Menlo" charset="0"/>
+              </a:rPr>
+              <a:t>    outputBinding</a:t>
+            </a:r>
+            <a:r>
+              <a:rPr lang="en-US" dirty="0">
+                <a:solidFill>
+                  <a:schemeClr val="tx1"/>
+                </a:solidFill>
+                <a:latin typeface="Menlo" charset="0"/>
+                <a:ea typeface="Menlo" charset="0"/>
+                <a:cs typeface="Menlo" charset="0"/>
+              </a:rPr>
+              <a:t>:</a:t>
+            </a:r>
+            <a:br>
+              <a:rPr lang="en-US" dirty="0">
+                <a:solidFill>
+                  <a:schemeClr val="tx1"/>
+                </a:solidFill>
+                <a:latin typeface="Menlo" charset="0"/>
+                <a:ea typeface="Menlo" charset="0"/>
+                <a:cs typeface="Menlo" charset="0"/>
+              </a:rPr>
+            </a:br>
+            <a:r>
+              <a:rPr lang="en-US" dirty="0">
+                <a:solidFill>
+                  <a:schemeClr val="tx1"/>
+                </a:solidFill>
+                <a:latin typeface="Menlo" charset="0"/>
+                <a:ea typeface="Menlo" charset="0"/>
+                <a:cs typeface="Menlo" charset="0"/>
+              </a:rPr>
+              <a:t>  </a:t>
+            </a:r>
+            <a:r>
+              <a:rPr lang="en-US" dirty="0" smtClean="0">
+                <a:solidFill>
+                  <a:schemeClr val="tx1"/>
+                </a:solidFill>
+                <a:latin typeface="Menlo" charset="0"/>
+                <a:ea typeface="Menlo" charset="0"/>
+                <a:cs typeface="Menlo" charset="0"/>
+              </a:rPr>
+              <a:t>    glob</a:t>
+            </a:r>
+            <a:r>
+              <a:rPr lang="en-US" dirty="0">
+                <a:solidFill>
+                  <a:schemeClr val="tx1"/>
+                </a:solidFill>
+                <a:latin typeface="Menlo" charset="0"/>
+                <a:ea typeface="Menlo" charset="0"/>
+                <a:cs typeface="Menlo" charset="0"/>
+              </a:rPr>
+              <a:t>: "*"</a:t>
             </a:r>
             <a:r>
               <a:rPr lang="en-US" dirty="0">
@@ -6747,7 +6814,7 @@
         </p:nvSpPr>
         <p:spPr>
           <a:xfrm>
-            <a:off x="8080955" y="1156211"/>
+            <a:off x="8080955" y="1099059"/>
             <a:ext cx="3657600" cy="369332"/>
           </a:xfrm>
           <a:prstGeom prst="rect">
@@ -6837,7 +6904,7 @@
         </p:nvSpPr>
         <p:spPr>
           <a:xfrm>
-            <a:off x="8080955" y="5914278"/>
+            <a:off x="8080955" y="6100018"/>
             <a:ext cx="3657600" cy="369332"/>
           </a:xfrm>
           <a:prstGeom prst="rect">
@@ -6905,7 +6972,7 @@
         </p:nvSpPr>
         <p:spPr>
           <a:xfrm>
-            <a:off x="8080955" y="844303"/>
+            <a:off x="8080955" y="787151"/>
             <a:ext cx="3657600" cy="307777"/>
           </a:xfrm>
           <a:prstGeom prst="rect">
@@ -6943,7 +7010,7 @@
         </p:nvSpPr>
         <p:spPr>
           <a:xfrm>
-            <a:off x="8080955" y="1703753"/>
+            <a:off x="8080955" y="1489436"/>
             <a:ext cx="3657600" cy="307777"/>
           </a:xfrm>
           <a:prstGeom prst="rect">
@@ -6981,7 +7048,7 @@
         </p:nvSpPr>
         <p:spPr>
           <a:xfrm>
-            <a:off x="8080955" y="5605211"/>
+            <a:off x="8080955" y="5790951"/>
             <a:ext cx="3657600" cy="307777"/>
           </a:xfrm>
           <a:prstGeom prst="rect">
@@ -7804,7 +7871,7 @@
         </p:nvSpPr>
         <p:spPr>
           <a:xfrm>
-            <a:off x="6617361" y="3340332"/>
+            <a:off x="6617361" y="2925988"/>
             <a:ext cx="1689020" cy="785629"/>
           </a:xfrm>
           <a:prstGeom prst="rightArrow">

</xml_diff>